<commit_message>
added display predictions to flask app
</commit_message>
<xml_diff>
--- a/deliverables/Final Presentation.pptx
+++ b/deliverables/Final Presentation.pptx
@@ -12,7 +12,8 @@
     <p:sldId id="269" r:id="rId6"/>
     <p:sldId id="274" r:id="rId7"/>
     <p:sldId id="271" r:id="rId8"/>
-    <p:sldId id="257" r:id="rId9"/>
+    <p:sldId id="276" r:id="rId9"/>
+    <p:sldId id="257" r:id="rId10"/>
   </p:sldIdLst>
   <p:sldSz cx="12192000" cy="6858000"/>
   <p:notesSz cx="6858000" cy="9144000"/>
@@ -266,7 +267,7 @@
           <a:p>
             <a:fld id="{F3D61F6D-01E8-49D1-854D-BD1BA988FABE}" type="datetimeFigureOut">
               <a:rPr lang="en-US" smtClean="0"/>
-              <a:t>6/9/2019</a:t>
+              <a:t>6/10/2019</a:t>
             </a:fld>
             <a:endParaRPr lang="en-US"/>
           </a:p>
@@ -464,7 +465,7 @@
           <a:p>
             <a:fld id="{F3D61F6D-01E8-49D1-854D-BD1BA988FABE}" type="datetimeFigureOut">
               <a:rPr lang="en-US" smtClean="0"/>
-              <a:t>6/9/2019</a:t>
+              <a:t>6/10/2019</a:t>
             </a:fld>
             <a:endParaRPr lang="en-US"/>
           </a:p>
@@ -672,7 +673,7 @@
           <a:p>
             <a:fld id="{F3D61F6D-01E8-49D1-854D-BD1BA988FABE}" type="datetimeFigureOut">
               <a:rPr lang="en-US" smtClean="0"/>
-              <a:t>6/9/2019</a:t>
+              <a:t>6/10/2019</a:t>
             </a:fld>
             <a:endParaRPr lang="en-US"/>
           </a:p>
@@ -1056,7 +1057,7 @@
             <a:fld id="{D3421027-4EC0-9C48-8CFB-B8A3104CB056}" type="datetime1">
               <a:rPr lang="en-US" smtClean="0"/>
               <a:pPr/>
-              <a:t>6/9/2019</a:t>
+              <a:t>6/10/2019</a:t>
             </a:fld>
             <a:endParaRPr lang="en-US"/>
           </a:p>
@@ -1351,7 +1352,7 @@
           <a:p>
             <a:fld id="{FA5DAB8B-8178-D047-869E-5A62AF236443}" type="datetime1">
               <a:rPr lang="en-US" smtClean="0"/>
-              <a:t>6/9/2019</a:t>
+              <a:t>6/10/2019</a:t>
             </a:fld>
             <a:endParaRPr lang="en-US" dirty="0"/>
           </a:p>
@@ -1565,7 +1566,7 @@
             <a:fld id="{B9AB8213-A564-3C44-8CA0-968996562138}" type="datetime1">
               <a:rPr lang="en-US" smtClean="0"/>
               <a:pPr/>
-              <a:t>6/9/2019</a:t>
+              <a:t>6/10/2019</a:t>
             </a:fld>
             <a:endParaRPr lang="en-US"/>
           </a:p>
@@ -1835,7 +1836,7 @@
             <a:fld id="{0A83DA12-03A5-114A-ABAE-78CD6BB6AC19}" type="datetime1">
               <a:rPr lang="en-US" smtClean="0"/>
               <a:pPr/>
-              <a:t>6/9/2019</a:t>
+              <a:t>6/10/2019</a:t>
             </a:fld>
             <a:endParaRPr lang="en-US"/>
           </a:p>
@@ -2166,7 +2167,7 @@
             <a:fld id="{1FFF386F-14E4-954A-9EC2-E277FFD66D49}" type="datetime1">
               <a:rPr lang="en-US" smtClean="0"/>
               <a:pPr/>
-              <a:t>6/9/2019</a:t>
+              <a:t>6/10/2019</a:t>
             </a:fld>
             <a:endParaRPr lang="en-US"/>
           </a:p>
@@ -2635,7 +2636,7 @@
             <a:fld id="{D8FFCF06-3344-8345-BEA6-DDAEFCC6ECCE}" type="datetime1">
               <a:rPr lang="en-US" smtClean="0"/>
               <a:pPr/>
-              <a:t>6/9/2019</a:t>
+              <a:t>6/10/2019</a:t>
             </a:fld>
             <a:endParaRPr lang="en-US"/>
           </a:p>
@@ -2834,7 +2835,7 @@
           <a:p>
             <a:fld id="{F3D61F6D-01E8-49D1-854D-BD1BA988FABE}" type="datetimeFigureOut">
               <a:rPr lang="en-US" smtClean="0"/>
-              <a:t>6/9/2019</a:t>
+              <a:t>6/10/2019</a:t>
             </a:fld>
             <a:endParaRPr lang="en-US"/>
           </a:p>
@@ -2976,7 +2977,7 @@
             <a:fld id="{84C6D879-35D4-554E-9D6D-93E8130AA922}" type="datetime1">
               <a:rPr lang="en-US" smtClean="0"/>
               <a:pPr/>
-              <a:t>6/9/2019</a:t>
+              <a:t>6/10/2019</a:t>
             </a:fld>
             <a:endParaRPr lang="en-US"/>
           </a:p>
@@ -3285,7 +3286,7 @@
             <a:fld id="{AB182AE3-760A-8E44-AB65-03A533386DFC}" type="datetime1">
               <a:rPr lang="en-US" smtClean="0"/>
               <a:pPr/>
-              <a:t>6/9/2019</a:t>
+              <a:t>6/10/2019</a:t>
             </a:fld>
             <a:endParaRPr lang="en-US"/>
           </a:p>
@@ -3563,7 +3564,7 @@
             <a:fld id="{B362BA78-8688-C546-A03A-2A39F84C0B58}" type="datetime1">
               <a:rPr lang="en-US" smtClean="0"/>
               <a:pPr/>
-              <a:t>6/9/2019</a:t>
+              <a:t>6/10/2019</a:t>
             </a:fld>
             <a:endParaRPr lang="en-US"/>
           </a:p>
@@ -3783,7 +3784,7 @@
             <a:fld id="{EF5B9135-15EF-DE46-84CC-16626B0FAF7F}" type="datetime1">
               <a:rPr lang="en-US" smtClean="0"/>
               <a:pPr/>
-              <a:t>6/9/2019</a:t>
+              <a:t>6/10/2019</a:t>
             </a:fld>
             <a:endParaRPr lang="en-US"/>
           </a:p>
@@ -4031,7 +4032,7 @@
           <a:p>
             <a:fld id="{99477ADD-011F-3541-9724-9C7FC92455D5}" type="datetime1">
               <a:rPr lang="en-US" smtClean="0"/>
-              <a:t>6/9/2019</a:t>
+              <a:t>6/10/2019</a:t>
             </a:fld>
             <a:endParaRPr lang="en-US"/>
           </a:p>
@@ -4439,7 +4440,7 @@
           <a:p>
             <a:fld id="{F3D61F6D-01E8-49D1-854D-BD1BA988FABE}" type="datetimeFigureOut">
               <a:rPr lang="en-US" smtClean="0"/>
-              <a:t>6/9/2019</a:t>
+              <a:t>6/10/2019</a:t>
             </a:fld>
             <a:endParaRPr lang="en-US"/>
           </a:p>
@@ -4704,7 +4705,7 @@
           <a:p>
             <a:fld id="{F3D61F6D-01E8-49D1-854D-BD1BA988FABE}" type="datetimeFigureOut">
               <a:rPr lang="en-US" smtClean="0"/>
-              <a:t>6/9/2019</a:t>
+              <a:t>6/10/2019</a:t>
             </a:fld>
             <a:endParaRPr lang="en-US"/>
           </a:p>
@@ -5116,7 +5117,7 @@
           <a:p>
             <a:fld id="{F3D61F6D-01E8-49D1-854D-BD1BA988FABE}" type="datetimeFigureOut">
               <a:rPr lang="en-US" smtClean="0"/>
-              <a:t>6/9/2019</a:t>
+              <a:t>6/10/2019</a:t>
             </a:fld>
             <a:endParaRPr lang="en-US"/>
           </a:p>
@@ -5257,7 +5258,7 @@
           <a:p>
             <a:fld id="{F3D61F6D-01E8-49D1-854D-BD1BA988FABE}" type="datetimeFigureOut">
               <a:rPr lang="en-US" smtClean="0"/>
-              <a:t>6/9/2019</a:t>
+              <a:t>6/10/2019</a:t>
             </a:fld>
             <a:endParaRPr lang="en-US"/>
           </a:p>
@@ -5370,7 +5371,7 @@
           <a:p>
             <a:fld id="{F3D61F6D-01E8-49D1-854D-BD1BA988FABE}" type="datetimeFigureOut">
               <a:rPr lang="en-US" smtClean="0"/>
-              <a:t>6/9/2019</a:t>
+              <a:t>6/10/2019</a:t>
             </a:fld>
             <a:endParaRPr lang="en-US"/>
           </a:p>
@@ -5681,7 +5682,7 @@
           <a:p>
             <a:fld id="{F3D61F6D-01E8-49D1-854D-BD1BA988FABE}" type="datetimeFigureOut">
               <a:rPr lang="en-US" smtClean="0"/>
-              <a:t>6/9/2019</a:t>
+              <a:t>6/10/2019</a:t>
             </a:fld>
             <a:endParaRPr lang="en-US"/>
           </a:p>
@@ -5969,7 +5970,7 @@
           <a:p>
             <a:fld id="{F3D61F6D-01E8-49D1-854D-BD1BA988FABE}" type="datetimeFigureOut">
               <a:rPr lang="en-US" smtClean="0"/>
-              <a:t>6/9/2019</a:t>
+              <a:t>6/10/2019</a:t>
             </a:fld>
             <a:endParaRPr lang="en-US"/>
           </a:p>
@@ -6210,7 +6211,7 @@
           <a:p>
             <a:fld id="{F3D61F6D-01E8-49D1-854D-BD1BA988FABE}" type="datetimeFigureOut">
               <a:rPr lang="en-US" smtClean="0"/>
-              <a:t>6/9/2019</a:t>
+              <a:t>6/10/2019</a:t>
             </a:fld>
             <a:endParaRPr lang="en-US"/>
           </a:p>
@@ -6760,7 +6761,7 @@
           <a:p>
             <a:fld id="{D98C176C-065F-124D-AAA4-94F2B7A2EC7C}" type="datetime1">
               <a:rPr lang="en-US" smtClean="0"/>
-              <a:t>6/9/2019</a:t>
+              <a:t>6/10/2019</a:t>
             </a:fld>
             <a:endParaRPr lang="en-US"/>
           </a:p>
@@ -9313,6 +9314,438 @@
 </file>
 
 <file path=ppt/slides/slide7.xml><?xml version="1.0" encoding="utf-8"?>
+<p:sld xmlns:a="http://schemas.openxmlformats.org/drawingml/2006/main" xmlns:r="http://schemas.openxmlformats.org/officeDocument/2006/relationships" xmlns:p="http://schemas.openxmlformats.org/presentationml/2006/main">
+  <p:cSld>
+    <p:spTree>
+      <p:nvGrpSpPr>
+        <p:cNvPr id="1" name=""/>
+        <p:cNvGrpSpPr/>
+        <p:nvPr/>
+      </p:nvGrpSpPr>
+      <p:grpSpPr>
+        <a:xfrm>
+          <a:off x="0" y="0"/>
+          <a:ext cx="0" cy="0"/>
+          <a:chOff x="0" y="0"/>
+          <a:chExt cx="0" cy="0"/>
+        </a:xfrm>
+      </p:grpSpPr>
+      <p:sp>
+        <p:nvSpPr>
+          <p:cNvPr id="4" name="Slide Number Placeholder 3">
+            <a:extLst>
+              <a:ext uri="{FF2B5EF4-FFF2-40B4-BE49-F238E27FC236}">
+                <a16:creationId xmlns:a16="http://schemas.microsoft.com/office/drawing/2014/main" id="{1210DD4F-E628-4FE8-B790-DC817A413900}"/>
+              </a:ext>
+            </a:extLst>
+          </p:cNvPr>
+          <p:cNvSpPr>
+            <a:spLocks noGrp="1"/>
+          </p:cNvSpPr>
+          <p:nvPr>
+            <p:ph type="sldNum" sz="quarter" idx="12"/>
+          </p:nvPr>
+        </p:nvSpPr>
+        <p:spPr/>
+        <p:txBody>
+          <a:bodyPr/>
+          <a:lstStyle/>
+          <a:p>
+            <a:fld id="{106E12CD-FCB1-464E-A775-0B83FDDACE03}" type="slidenum">
+              <a:rPr lang="en-US" smtClean="0"/>
+              <a:pPr/>
+              <a:t>7</a:t>
+            </a:fld>
+            <a:endParaRPr lang="en-US" dirty="0"/>
+          </a:p>
+        </p:txBody>
+      </p:sp>
+      <p:sp>
+        <p:nvSpPr>
+          <p:cNvPr id="7" name="Title 1">
+            <a:extLst>
+              <a:ext uri="{FF2B5EF4-FFF2-40B4-BE49-F238E27FC236}">
+                <a16:creationId xmlns:a16="http://schemas.microsoft.com/office/drawing/2014/main" id="{F8A1A429-F0D2-457C-A019-2F540F26053D}"/>
+              </a:ext>
+            </a:extLst>
+          </p:cNvPr>
+          <p:cNvSpPr txBox="1">
+            <a:spLocks/>
+          </p:cNvSpPr>
+          <p:nvPr/>
+        </p:nvSpPr>
+        <p:spPr>
+          <a:xfrm>
+            <a:off x="838200" y="365125"/>
+            <a:ext cx="10515600" cy="1325563"/>
+          </a:xfrm>
+          <a:prstGeom prst="rect">
+            <a:avLst/>
+          </a:prstGeom>
+        </p:spPr>
+        <p:txBody>
+          <a:bodyPr vert="horz" lIns="91440" tIns="45720" rIns="91440" bIns="45720" rtlCol="0" anchor="ctr">
+            <a:normAutofit/>
+          </a:bodyPr>
+          <a:lstStyle>
+            <a:lvl1pPr algn="l" defTabSz="914400" rtl="0" eaLnBrk="1" latinLnBrk="0" hangingPunct="1">
+              <a:lnSpc>
+                <a:spcPct val="90000"/>
+              </a:lnSpc>
+              <a:spcBef>
+                <a:spcPct val="0"/>
+              </a:spcBef>
+              <a:buNone/>
+              <a:defRPr sz="4400" kern="1200">
+                <a:solidFill>
+                  <a:schemeClr val="tx1"/>
+                </a:solidFill>
+                <a:latin typeface="+mj-lt"/>
+                <a:ea typeface="+mj-ea"/>
+                <a:cs typeface="+mj-cs"/>
+              </a:defRPr>
+            </a:lvl1pPr>
+          </a:lstStyle>
+          <a:p>
+            <a:pPr marL="0" marR="0" lvl="0" indent="0" algn="l" defTabSz="914400" rtl="0" eaLnBrk="1" fontAlgn="auto" latinLnBrk="0" hangingPunct="1">
+              <a:lnSpc>
+                <a:spcPct val="90000"/>
+              </a:lnSpc>
+              <a:spcBef>
+                <a:spcPct val="0"/>
+              </a:spcBef>
+              <a:spcAft>
+                <a:spcPts val="0"/>
+              </a:spcAft>
+              <a:buClrTx/>
+              <a:buSzTx/>
+              <a:buFontTx/>
+              <a:buNone/>
+              <a:tabLst/>
+              <a:defRPr/>
+            </a:pPr>
+            <a:r>
+              <a:rPr kumimoji="0" lang="en-US" sz="4400" b="0" i="0" u="none" strike="noStrike" kern="1200" cap="none" spc="0" normalizeH="0" baseline="0" noProof="0" dirty="0">
+                <a:ln>
+                  <a:noFill/>
+                </a:ln>
+                <a:solidFill>
+                  <a:sysClr val="windowText" lastClr="000000"/>
+                </a:solidFill>
+                <a:effectLst/>
+                <a:uLnTx/>
+                <a:uFillTx/>
+                <a:latin typeface="Calibri Light" panose="020F0302020204030204"/>
+                <a:ea typeface="+mj-ea"/>
+                <a:cs typeface="+mj-cs"/>
+              </a:rPr>
+              <a:t>Improvements Needed</a:t>
+            </a:r>
+          </a:p>
+        </p:txBody>
+      </p:sp>
+      <p:sp>
+        <p:nvSpPr>
+          <p:cNvPr id="8" name="Content Placeholder 2">
+            <a:extLst>
+              <a:ext uri="{FF2B5EF4-FFF2-40B4-BE49-F238E27FC236}">
+                <a16:creationId xmlns:a16="http://schemas.microsoft.com/office/drawing/2014/main" id="{1C6EBA25-F1DF-4050-8CE5-FF807C9BCD19}"/>
+              </a:ext>
+            </a:extLst>
+          </p:cNvPr>
+          <p:cNvSpPr txBox="1">
+            <a:spLocks/>
+          </p:cNvSpPr>
+          <p:nvPr/>
+        </p:nvSpPr>
+        <p:spPr>
+          <a:xfrm>
+            <a:off x="838200" y="1825625"/>
+            <a:ext cx="10515600" cy="4351338"/>
+          </a:xfrm>
+          <a:prstGeom prst="rect">
+            <a:avLst/>
+          </a:prstGeom>
+        </p:spPr>
+        <p:txBody>
+          <a:bodyPr vert="horz" lIns="91440" tIns="45720" rIns="91440" bIns="45720" rtlCol="0">
+            <a:normAutofit/>
+          </a:bodyPr>
+          <a:lstStyle>
+            <a:lvl1pPr marL="228600" indent="-228600" algn="l" defTabSz="914400" rtl="0" eaLnBrk="1" latinLnBrk="0" hangingPunct="1">
+              <a:lnSpc>
+                <a:spcPct val="90000"/>
+              </a:lnSpc>
+              <a:spcBef>
+                <a:spcPts val="1000"/>
+              </a:spcBef>
+              <a:buFont typeface="Arial" panose="020B0604020202020204" pitchFamily="34" charset="0"/>
+              <a:buChar char="•"/>
+              <a:defRPr sz="2800" kern="1200">
+                <a:solidFill>
+                  <a:schemeClr val="tx1"/>
+                </a:solidFill>
+                <a:latin typeface="+mn-lt"/>
+                <a:ea typeface="+mn-ea"/>
+                <a:cs typeface="+mn-cs"/>
+              </a:defRPr>
+            </a:lvl1pPr>
+            <a:lvl2pPr marL="685800" indent="-228600" algn="l" defTabSz="914400" rtl="0" eaLnBrk="1" latinLnBrk="0" hangingPunct="1">
+              <a:lnSpc>
+                <a:spcPct val="90000"/>
+              </a:lnSpc>
+              <a:spcBef>
+                <a:spcPts val="500"/>
+              </a:spcBef>
+              <a:buFont typeface="Arial" panose="020B0604020202020204" pitchFamily="34" charset="0"/>
+              <a:buChar char="•"/>
+              <a:defRPr sz="2400" kern="1200">
+                <a:solidFill>
+                  <a:schemeClr val="tx1"/>
+                </a:solidFill>
+                <a:latin typeface="+mn-lt"/>
+                <a:ea typeface="+mn-ea"/>
+                <a:cs typeface="+mn-cs"/>
+              </a:defRPr>
+            </a:lvl2pPr>
+            <a:lvl3pPr marL="1143000" indent="-228600" algn="l" defTabSz="914400" rtl="0" eaLnBrk="1" latinLnBrk="0" hangingPunct="1">
+              <a:lnSpc>
+                <a:spcPct val="90000"/>
+              </a:lnSpc>
+              <a:spcBef>
+                <a:spcPts val="500"/>
+              </a:spcBef>
+              <a:buFont typeface="Arial" panose="020B0604020202020204" pitchFamily="34" charset="0"/>
+              <a:buChar char="•"/>
+              <a:defRPr sz="2000" kern="1200">
+                <a:solidFill>
+                  <a:schemeClr val="tx1"/>
+                </a:solidFill>
+                <a:latin typeface="+mn-lt"/>
+                <a:ea typeface="+mn-ea"/>
+                <a:cs typeface="+mn-cs"/>
+              </a:defRPr>
+            </a:lvl3pPr>
+            <a:lvl4pPr marL="1600200" indent="-228600" algn="l" defTabSz="914400" rtl="0" eaLnBrk="1" latinLnBrk="0" hangingPunct="1">
+              <a:lnSpc>
+                <a:spcPct val="90000"/>
+              </a:lnSpc>
+              <a:spcBef>
+                <a:spcPts val="500"/>
+              </a:spcBef>
+              <a:buFont typeface="Arial" panose="020B0604020202020204" pitchFamily="34" charset="0"/>
+              <a:buChar char="•"/>
+              <a:defRPr sz="1800" kern="1200">
+                <a:solidFill>
+                  <a:schemeClr val="tx1"/>
+                </a:solidFill>
+                <a:latin typeface="+mn-lt"/>
+                <a:ea typeface="+mn-ea"/>
+                <a:cs typeface="+mn-cs"/>
+              </a:defRPr>
+            </a:lvl4pPr>
+            <a:lvl5pPr marL="2057400" indent="-228600" algn="l" defTabSz="914400" rtl="0" eaLnBrk="1" latinLnBrk="0" hangingPunct="1">
+              <a:lnSpc>
+                <a:spcPct val="90000"/>
+              </a:lnSpc>
+              <a:spcBef>
+                <a:spcPts val="500"/>
+              </a:spcBef>
+              <a:buFont typeface="Arial" panose="020B0604020202020204" pitchFamily="34" charset="0"/>
+              <a:buChar char="•"/>
+              <a:defRPr sz="1800" kern="1200">
+                <a:solidFill>
+                  <a:schemeClr val="tx1"/>
+                </a:solidFill>
+                <a:latin typeface="+mn-lt"/>
+                <a:ea typeface="+mn-ea"/>
+                <a:cs typeface="+mn-cs"/>
+              </a:defRPr>
+            </a:lvl5pPr>
+            <a:lvl6pPr marL="2514600" indent="-228600" algn="l" defTabSz="914400" rtl="0" eaLnBrk="1" latinLnBrk="0" hangingPunct="1">
+              <a:lnSpc>
+                <a:spcPct val="90000"/>
+              </a:lnSpc>
+              <a:spcBef>
+                <a:spcPts val="500"/>
+              </a:spcBef>
+              <a:buFont typeface="Arial" panose="020B0604020202020204" pitchFamily="34" charset="0"/>
+              <a:buChar char="•"/>
+              <a:defRPr sz="1800" kern="1200">
+                <a:solidFill>
+                  <a:schemeClr val="tx1"/>
+                </a:solidFill>
+                <a:latin typeface="+mn-lt"/>
+                <a:ea typeface="+mn-ea"/>
+                <a:cs typeface="+mn-cs"/>
+              </a:defRPr>
+            </a:lvl6pPr>
+            <a:lvl7pPr marL="2971800" indent="-228600" algn="l" defTabSz="914400" rtl="0" eaLnBrk="1" latinLnBrk="0" hangingPunct="1">
+              <a:lnSpc>
+                <a:spcPct val="90000"/>
+              </a:lnSpc>
+              <a:spcBef>
+                <a:spcPts val="500"/>
+              </a:spcBef>
+              <a:buFont typeface="Arial" panose="020B0604020202020204" pitchFamily="34" charset="0"/>
+              <a:buChar char="•"/>
+              <a:defRPr sz="1800" kern="1200">
+                <a:solidFill>
+                  <a:schemeClr val="tx1"/>
+                </a:solidFill>
+                <a:latin typeface="+mn-lt"/>
+                <a:ea typeface="+mn-ea"/>
+                <a:cs typeface="+mn-cs"/>
+              </a:defRPr>
+            </a:lvl7pPr>
+            <a:lvl8pPr marL="3429000" indent="-228600" algn="l" defTabSz="914400" rtl="0" eaLnBrk="1" latinLnBrk="0" hangingPunct="1">
+              <a:lnSpc>
+                <a:spcPct val="90000"/>
+              </a:lnSpc>
+              <a:spcBef>
+                <a:spcPts val="500"/>
+              </a:spcBef>
+              <a:buFont typeface="Arial" panose="020B0604020202020204" pitchFamily="34" charset="0"/>
+              <a:buChar char="•"/>
+              <a:defRPr sz="1800" kern="1200">
+                <a:solidFill>
+                  <a:schemeClr val="tx1"/>
+                </a:solidFill>
+                <a:latin typeface="+mn-lt"/>
+                <a:ea typeface="+mn-ea"/>
+                <a:cs typeface="+mn-cs"/>
+              </a:defRPr>
+            </a:lvl8pPr>
+            <a:lvl9pPr marL="3886200" indent="-228600" algn="l" defTabSz="914400" rtl="0" eaLnBrk="1" latinLnBrk="0" hangingPunct="1">
+              <a:lnSpc>
+                <a:spcPct val="90000"/>
+              </a:lnSpc>
+              <a:spcBef>
+                <a:spcPts val="500"/>
+              </a:spcBef>
+              <a:buFont typeface="Arial" panose="020B0604020202020204" pitchFamily="34" charset="0"/>
+              <a:buChar char="•"/>
+              <a:defRPr sz="1800" kern="1200">
+                <a:solidFill>
+                  <a:schemeClr val="tx1"/>
+                </a:solidFill>
+                <a:latin typeface="+mn-lt"/>
+                <a:ea typeface="+mn-ea"/>
+                <a:cs typeface="+mn-cs"/>
+              </a:defRPr>
+            </a:lvl9pPr>
+          </a:lstStyle>
+          <a:p>
+            <a:pPr marL="228600" marR="0" lvl="0" indent="-228600" algn="l" defTabSz="914400" rtl="0" eaLnBrk="1" fontAlgn="auto" latinLnBrk="0" hangingPunct="1">
+              <a:lnSpc>
+                <a:spcPct val="90000"/>
+              </a:lnSpc>
+              <a:spcBef>
+                <a:spcPts val="1000"/>
+              </a:spcBef>
+              <a:spcAft>
+                <a:spcPts val="0"/>
+              </a:spcAft>
+              <a:buClrTx/>
+              <a:buSzTx/>
+              <a:buFont typeface="Arial" panose="020B0604020202020204" pitchFamily="34" charset="0"/>
+              <a:buChar char="•"/>
+              <a:tabLst/>
+              <a:defRPr/>
+            </a:pPr>
+            <a:endParaRPr kumimoji="0" lang="en-US" b="0" i="0" u="none" strike="noStrike" kern="1200" cap="none" spc="0" normalizeH="0" baseline="0" noProof="0" dirty="0">
+              <a:ln>
+                <a:noFill/>
+              </a:ln>
+              <a:solidFill>
+                <a:sysClr val="windowText" lastClr="000000"/>
+              </a:solidFill>
+              <a:effectLst/>
+              <a:uLnTx/>
+              <a:uFillTx/>
+              <a:latin typeface="Calibri" panose="020F0502020204030204"/>
+              <a:ea typeface="+mn-ea"/>
+              <a:cs typeface="+mn-cs"/>
+            </a:endParaRPr>
+          </a:p>
+        </p:txBody>
+      </p:sp>
+      <p:sp>
+        <p:nvSpPr>
+          <p:cNvPr id="3" name="TextBox 2">
+            <a:extLst>
+              <a:ext uri="{FF2B5EF4-FFF2-40B4-BE49-F238E27FC236}">
+                <a16:creationId xmlns:a16="http://schemas.microsoft.com/office/drawing/2014/main" id="{06960353-0CE6-482B-8627-C86FFDA6C160}"/>
+              </a:ext>
+            </a:extLst>
+          </p:cNvPr>
+          <p:cNvSpPr txBox="1"/>
+          <p:nvPr/>
+        </p:nvSpPr>
+        <p:spPr>
+          <a:xfrm>
+            <a:off x="732692" y="1690688"/>
+            <a:ext cx="7409785" cy="1846659"/>
+          </a:xfrm>
+          <a:prstGeom prst="rect">
+            <a:avLst/>
+          </a:prstGeom>
+          <a:noFill/>
+        </p:spPr>
+        <p:txBody>
+          <a:bodyPr wrap="none" rtlCol="0">
+            <a:spAutoFit/>
+          </a:bodyPr>
+          <a:lstStyle/>
+          <a:p>
+            <a:pPr marL="285750" indent="-285750">
+              <a:buFont typeface="Arial" panose="020B0604020202020204" pitchFamily="34" charset="0"/>
+              <a:buChar char="•"/>
+            </a:pPr>
+            <a:r>
+              <a:rPr lang="en-US" sz="3200" dirty="0"/>
+              <a:t>Better User input interface.</a:t>
+            </a:r>
+          </a:p>
+          <a:p>
+            <a:pPr marL="285750" indent="-285750">
+              <a:buFont typeface="Arial" panose="020B0604020202020204" pitchFamily="34" charset="0"/>
+              <a:buChar char="•"/>
+            </a:pPr>
+            <a:r>
+              <a:rPr lang="en-US" sz="3200" dirty="0"/>
+              <a:t>Genre filter to help narrow down choices.</a:t>
+            </a:r>
+          </a:p>
+          <a:p>
+            <a:pPr marL="285750" indent="-285750">
+              <a:buFont typeface="Arial" panose="020B0604020202020204" pitchFamily="34" charset="0"/>
+              <a:buChar char="•"/>
+            </a:pPr>
+            <a:r>
+              <a:rPr lang="en-US" sz="3200" dirty="0"/>
+              <a:t>Use bigger dataset.</a:t>
+            </a:r>
+          </a:p>
+          <a:p>
+            <a:endParaRPr lang="en-US" dirty="0"/>
+          </a:p>
+        </p:txBody>
+      </p:sp>
+    </p:spTree>
+    <p:extLst>
+      <p:ext uri="{BB962C8B-B14F-4D97-AF65-F5344CB8AC3E}">
+        <p14:creationId xmlns:p14="http://schemas.microsoft.com/office/powerpoint/2010/main" val="2557134734"/>
+      </p:ext>
+    </p:extLst>
+  </p:cSld>
+  <p:clrMapOvr>
+    <a:masterClrMapping/>
+  </p:clrMapOvr>
+</p:sld>
+</file>
+
+<file path=ppt/slides/slide8.xml><?xml version="1.0" encoding="utf-8"?>
 <p:sld xmlns:a="http://schemas.openxmlformats.org/drawingml/2006/main" xmlns:r="http://schemas.openxmlformats.org/officeDocument/2006/relationships" xmlns:p="http://schemas.openxmlformats.org/presentationml/2006/main">
   <p:cSld>
     <p:spTree>

</xml_diff>